<commit_message>
Update Domingos Protein Prediction Presentation.pptx
</commit_message>
<xml_diff>
--- a/Domingos Protein Prediction Presentation.pptx
+++ b/Domingos Protein Prediction Presentation.pptx
@@ -6,6 +6,8 @@
   </p:sldMasterIdLst>
   <p:sldIdLst>
     <p:sldId id="256" r:id="rId2"/>
+    <p:sldId id="257" r:id="rId3"/>
+    <p:sldId id="258" r:id="rId4"/>
   </p:sldIdLst>
   <p:sldSz cx="12192000" cy="6858000"/>
   <p:notesSz cx="6858000" cy="9144000"/>
@@ -104,6 +106,11 @@
       </a:defRPr>
     </a:lvl9pPr>
   </p:defaultTextStyle>
+  <p:extLst>
+    <p:ext uri="{EFAFB233-063F-42B5-8137-9DF3F51BA10A}">
+      <p15:sldGuideLst xmlns:p15="http://schemas.microsoft.com/office/powerpoint/2012/main"/>
+    </p:ext>
+  </p:extLst>
 </p:presentation>
 </file>
 
@@ -1517,7 +1524,7 @@
             <a:fld id="{48A87A34-81AB-432B-8DAE-1953F412C126}" type="datetimeFigureOut">
               <a:rPr lang="en-US" smtClean="0"/>
               <a:pPr/>
-              <a:t>5/5/23</a:t>
+              <a:t>5/6/23</a:t>
             </a:fld>
             <a:endParaRPr lang="en-US" dirty="0"/>
           </a:p>
@@ -2976,7 +2983,7 @@
           <a:p>
             <a:fld id="{48A87A34-81AB-432B-8DAE-1953F412C126}" type="datetimeFigureOut">
               <a:rPr lang="en-US" smtClean="0"/>
-              <a:t>5/5/23</a:t>
+              <a:t>5/6/23</a:t>
             </a:fld>
             <a:endParaRPr lang="en-US" dirty="0"/>
           </a:p>
@@ -4429,7 +4436,7 @@
           <a:p>
             <a:fld id="{48A87A34-81AB-432B-8DAE-1953F412C126}" type="datetimeFigureOut">
               <a:rPr lang="en-US" smtClean="0"/>
-              <a:t>5/5/23</a:t>
+              <a:t>5/6/23</a:t>
             </a:fld>
             <a:endParaRPr lang="en-US" dirty="0"/>
           </a:p>
@@ -5884,7 +5891,7 @@
           <a:p>
             <a:fld id="{48A87A34-81AB-432B-8DAE-1953F412C126}" type="datetimeFigureOut">
               <a:rPr lang="en-US" smtClean="0"/>
-              <a:t>5/5/23</a:t>
+              <a:t>5/6/23</a:t>
             </a:fld>
             <a:endParaRPr lang="en-US" dirty="0"/>
           </a:p>
@@ -7392,7 +7399,7 @@
           <a:p>
             <a:fld id="{48A87A34-81AB-432B-8DAE-1953F412C126}" type="datetimeFigureOut">
               <a:rPr lang="en-US" smtClean="0"/>
-              <a:t>5/5/23</a:t>
+              <a:t>5/6/23</a:t>
             </a:fld>
             <a:endParaRPr lang="en-US" dirty="0"/>
           </a:p>
@@ -8913,7 +8920,7 @@
           <a:p>
             <a:fld id="{48A87A34-81AB-432B-8DAE-1953F412C126}" type="datetimeFigureOut">
               <a:rPr lang="en-US" smtClean="0"/>
-              <a:t>5/5/23</a:t>
+              <a:t>5/6/23</a:t>
             </a:fld>
             <a:endParaRPr lang="en-US" dirty="0"/>
           </a:p>
@@ -10578,7 +10585,7 @@
           <a:p>
             <a:fld id="{48A87A34-81AB-432B-8DAE-1953F412C126}" type="datetimeFigureOut">
               <a:rPr lang="en-US" smtClean="0"/>
-              <a:t>5/5/23</a:t>
+              <a:t>5/6/23</a:t>
             </a:fld>
             <a:endParaRPr lang="en-US" dirty="0"/>
           </a:p>
@@ -11976,7 +11983,7 @@
           <a:p>
             <a:fld id="{48A87A34-81AB-432B-8DAE-1953F412C126}" type="datetimeFigureOut">
               <a:rPr lang="en-US" smtClean="0"/>
-              <a:t>5/5/23</a:t>
+              <a:t>5/6/23</a:t>
             </a:fld>
             <a:endParaRPr lang="en-US" dirty="0"/>
           </a:p>
@@ -12076,7 +12083,7 @@
           <a:p>
             <a:fld id="{48A87A34-81AB-432B-8DAE-1953F412C126}" type="datetimeFigureOut">
               <a:rPr lang="en-US" smtClean="0"/>
-              <a:t>5/5/23</a:t>
+              <a:t>5/6/23</a:t>
             </a:fld>
             <a:endParaRPr lang="en-US" dirty="0"/>
           </a:p>
@@ -13602,7 +13609,7 @@
           <a:p>
             <a:fld id="{48A87A34-81AB-432B-8DAE-1953F412C126}" type="datetimeFigureOut">
               <a:rPr lang="en-US" smtClean="0"/>
-              <a:t>5/5/23</a:t>
+              <a:t>5/6/23</a:t>
             </a:fld>
             <a:endParaRPr lang="en-US" dirty="0"/>
           </a:p>
@@ -15138,7 +15145,7 @@
           <a:p>
             <a:fld id="{48A87A34-81AB-432B-8DAE-1953F412C126}" type="datetimeFigureOut">
               <a:rPr lang="en-US" smtClean="0"/>
-              <a:t>5/5/23</a:t>
+              <a:t>5/6/23</a:t>
             </a:fld>
             <a:endParaRPr lang="en-US" dirty="0"/>
           </a:p>
@@ -15362,7 +15369,7 @@
             <a:fld id="{48A87A34-81AB-432B-8DAE-1953F412C126}" type="datetimeFigureOut">
               <a:rPr lang="en-US" smtClean="0"/>
               <a:pPr/>
-              <a:t>5/5/23</a:t>
+              <a:t>5/6/23</a:t>
             </a:fld>
             <a:endParaRPr lang="en-US" dirty="0"/>
           </a:p>
@@ -15832,10 +15839,16 @@
         </p:nvSpPr>
         <p:spPr/>
         <p:txBody>
-          <a:bodyPr/>
+          <a:bodyPr>
+            <a:normAutofit fontScale="90000"/>
+          </a:bodyPr>
           <a:lstStyle/>
           <a:p>
-            <a:endParaRPr lang="en-US" dirty="0"/>
+            <a:pPr algn="r"/>
+            <a:r>
+              <a:rPr lang="en-US" dirty="0"/>
+              <a:t>ERROR IN ATOMIC POSITION IN PROTEIN STRUCTURAL PREDCTIONS</a:t>
+            </a:r>
           </a:p>
         </p:txBody>
       </p:sp>
@@ -15857,6 +15870,1772 @@
         </p:nvSpPr>
         <p:spPr/>
         <p:txBody>
+          <a:bodyPr>
+            <a:normAutofit/>
+          </a:bodyPr>
+          <a:lstStyle/>
+          <a:p>
+            <a:pPr marL="0" marR="114300" algn="r">
+              <a:spcBef>
+                <a:spcPts val="0"/>
+              </a:spcBef>
+              <a:spcAft>
+                <a:spcPts val="0"/>
+              </a:spcAft>
+            </a:pPr>
+            <a:endParaRPr lang="en-US" sz="2400" cap="small" dirty="0">
+              <a:solidFill>
+                <a:schemeClr val="bg1"/>
+              </a:solidFill>
+              <a:effectLst/>
+              <a:latin typeface="Calibri" panose="020F0502020204030204" pitchFamily="34" charset="0"/>
+              <a:ea typeface="DengXian" panose="02010600030101010101" pitchFamily="2" charset="-122"/>
+              <a:cs typeface="Times New Roman" panose="02020603050405020304" pitchFamily="18" charset="0"/>
+            </a:endParaRPr>
+          </a:p>
+          <a:p>
+            <a:pPr marL="0" marR="114300" algn="r">
+              <a:spcBef>
+                <a:spcPts val="0"/>
+              </a:spcBef>
+              <a:spcAft>
+                <a:spcPts val="0"/>
+              </a:spcAft>
+            </a:pPr>
+            <a:r>
+              <a:rPr lang="en-US" sz="2400" cap="small" dirty="0">
+                <a:solidFill>
+                  <a:schemeClr val="bg1"/>
+                </a:solidFill>
+                <a:effectLst/>
+                <a:latin typeface="Calibri" panose="020F0502020204030204" pitchFamily="34" charset="0"/>
+                <a:ea typeface="DengXian" panose="02010600030101010101" pitchFamily="2" charset="-122"/>
+                <a:cs typeface="Times New Roman" panose="02020603050405020304" pitchFamily="18" charset="0"/>
+              </a:rPr>
+              <a:t>Comparison of Regression Tree, Random Forest, and Deep Neural Network Methods</a:t>
+            </a:r>
+            <a:endParaRPr lang="en-US" sz="2400" dirty="0">
+              <a:solidFill>
+                <a:schemeClr val="bg1"/>
+              </a:solidFill>
+              <a:effectLst/>
+              <a:latin typeface="Calibri" panose="020F0502020204030204" pitchFamily="34" charset="0"/>
+              <a:ea typeface="DengXian" panose="02010600030101010101" pitchFamily="2" charset="-122"/>
+              <a:cs typeface="Times New Roman" panose="02020603050405020304" pitchFamily="18" charset="0"/>
+            </a:endParaRPr>
+          </a:p>
+        </p:txBody>
+      </p:sp>
+    </p:spTree>
+    <p:extLst>
+      <p:ext uri="{BB962C8B-B14F-4D97-AF65-F5344CB8AC3E}">
+        <p14:creationId xmlns:p14="http://schemas.microsoft.com/office/powerpoint/2010/main" val="2693138491"/>
+      </p:ext>
+    </p:extLst>
+  </p:cSld>
+  <p:clrMapOvr>
+    <a:masterClrMapping/>
+  </p:clrMapOvr>
+</p:sld>
+</file>
+
+<file path=ppt/slides/slide2.xml><?xml version="1.0" encoding="utf-8"?>
+<p:sld xmlns:a="http://schemas.openxmlformats.org/drawingml/2006/main" xmlns:r="http://schemas.openxmlformats.org/officeDocument/2006/relationships" xmlns:p="http://schemas.openxmlformats.org/presentationml/2006/main">
+  <p:cSld>
+    <p:bg>
+      <p:bgPr>
+        <a:solidFill>
+          <a:schemeClr val="bg1"/>
+        </a:solidFill>
+        <a:effectLst/>
+      </p:bgPr>
+    </p:bg>
+    <p:spTree>
+      <p:nvGrpSpPr>
+        <p:cNvPr id="1" name=""/>
+        <p:cNvGrpSpPr/>
+        <p:nvPr/>
+      </p:nvGrpSpPr>
+      <p:grpSpPr>
+        <a:xfrm>
+          <a:off x="0" y="0"/>
+          <a:ext cx="0" cy="0"/>
+          <a:chOff x="0" y="0"/>
+          <a:chExt cx="0" cy="0"/>
+        </a:xfrm>
+      </p:grpSpPr>
+      <p:sp>
+        <p:nvSpPr>
+          <p:cNvPr id="32" name="Rectangle 7">
+            <a:extLst>
+              <a:ext uri="{FF2B5EF4-FFF2-40B4-BE49-F238E27FC236}">
+                <a16:creationId xmlns:a16="http://schemas.microsoft.com/office/drawing/2014/main" id="{E2366EBA-92FD-44AE-87A9-25E5135EB2C9}"/>
+              </a:ext>
+              <a:ext uri="{C183D7F6-B498-43B3-948B-1728B52AA6E4}">
+                <adec:decorative xmlns:adec="http://schemas.microsoft.com/office/drawing/2017/decorative" val="1"/>
+              </a:ext>
+            </a:extLst>
+          </p:cNvPr>
+          <p:cNvSpPr>
+            <a:spLocks noGrp="1" noRot="1" noChangeAspect="1" noMove="1" noResize="1" noEditPoints="1" noAdjustHandles="1" noChangeArrowheads="1" noChangeShapeType="1" noTextEdit="1"/>
+          </p:cNvSpPr>
+          <p:nvPr>
+            <p:extLst>
+              <p:ext uri="{386F3935-93C4-4BCD-93E2-E3B085C9AB24}">
+                <p16:designElem xmlns:p16="http://schemas.microsoft.com/office/powerpoint/2015/main" val="1"/>
+              </p:ext>
+            </p:extLst>
+          </p:nvPr>
+        </p:nvSpPr>
+        <p:spPr>
+          <a:xfrm>
+            <a:off x="0" y="-1"/>
+            <a:ext cx="12192000" cy="6869209"/>
+          </a:xfrm>
+          <a:prstGeom prst="rect">
+            <a:avLst/>
+          </a:prstGeom>
+          <a:ln>
+            <a:noFill/>
+          </a:ln>
+        </p:spPr>
+        <p:style>
+          <a:lnRef idx="2">
+            <a:schemeClr val="accent1">
+              <a:shade val="50000"/>
+            </a:schemeClr>
+          </a:lnRef>
+          <a:fillRef idx="1">
+            <a:schemeClr val="accent1"/>
+          </a:fillRef>
+          <a:effectRef idx="0">
+            <a:schemeClr val="accent1"/>
+          </a:effectRef>
+          <a:fontRef idx="minor">
+            <a:schemeClr val="lt1"/>
+          </a:fontRef>
+        </p:style>
+        <p:txBody>
+          <a:bodyPr rtlCol="0" anchor="ctr"/>
+          <a:lstStyle/>
+          <a:p>
+            <a:pPr algn="ctr"/>
+            <a:endParaRPr lang="en-US"/>
+          </a:p>
+        </p:txBody>
+      </p:sp>
+      <p:grpSp>
+        <p:nvGrpSpPr>
+          <p:cNvPr id="34" name="Group 9">
+            <a:extLst>
+              <a:ext uri="{FF2B5EF4-FFF2-40B4-BE49-F238E27FC236}">
+                <a16:creationId xmlns:a16="http://schemas.microsoft.com/office/drawing/2014/main" id="{B437F5FC-01F7-4EB4-81E7-C27D917E9554}"/>
+              </a:ext>
+              <a:ext uri="{C183D7F6-B498-43B3-948B-1728B52AA6E4}">
+                <adec:decorative xmlns:adec="http://schemas.microsoft.com/office/drawing/2017/decorative" val="1"/>
+              </a:ext>
+            </a:extLst>
+          </p:cNvPr>
+          <p:cNvGrpSpPr>
+            <a:grpSpLocks noGrp="1" noUngrp="1" noRot="1" noChangeAspect="1" noMove="1" noResize="1"/>
+          </p:cNvGrpSpPr>
+          <p:nvPr>
+            <p:extLst>
+              <p:ext uri="{386F3935-93C4-4BCD-93E2-E3B085C9AB24}">
+                <p16:designElem xmlns:p16="http://schemas.microsoft.com/office/powerpoint/2015/main" val="1"/>
+              </p:ext>
+            </p:extLst>
+          </p:nvPr>
+        </p:nvGrpSpPr>
+        <p:grpSpPr>
+          <a:xfrm>
+            <a:off x="-417513" y="0"/>
+            <a:ext cx="12584114" cy="6853238"/>
+            <a:chOff x="-417513" y="0"/>
+            <a:chExt cx="12584114" cy="6853238"/>
+          </a:xfrm>
+        </p:grpSpPr>
+        <p:sp>
+          <p:nvSpPr>
+            <p:cNvPr id="11" name="Freeform 5">
+              <a:extLst>
+                <a:ext uri="{FF2B5EF4-FFF2-40B4-BE49-F238E27FC236}">
+                  <a16:creationId xmlns:a16="http://schemas.microsoft.com/office/drawing/2014/main" id="{4B0CFF10-4805-4BFA-961B-1F60DAEB948A}"/>
+                </a:ext>
+                <a:ext uri="{C183D7F6-B498-43B3-948B-1728B52AA6E4}">
+                  <adec:decorative xmlns:adec="http://schemas.microsoft.com/office/drawing/2017/decorative" val="1"/>
+                </a:ext>
+              </a:extLst>
+            </p:cNvPr>
+            <p:cNvSpPr/>
+            <p:nvPr>
+              <p:extLst>
+                <p:ext uri="{386F3935-93C4-4BCD-93E2-E3B085C9AB24}">
+                  <p16:designElem xmlns:p16="http://schemas.microsoft.com/office/powerpoint/2015/main" val="1"/>
+                </p:ext>
+              </p:extLst>
+            </p:nvPr>
+          </p:nvSpPr>
+          <p:spPr bwMode="auto">
+            <a:xfrm>
+              <a:off x="1306513" y="0"/>
+              <a:ext cx="3862388" cy="6843713"/>
+            </a:xfrm>
+            <a:custGeom>
+              <a:avLst/>
+              <a:gdLst/>
+              <a:ahLst/>
+              <a:cxnLst/>
+              <a:rect l="0" t="0" r="r" b="b"/>
+              <a:pathLst>
+                <a:path w="813" h="1440">
+                  <a:moveTo>
+                    <a:pt x="813" y="0"/>
+                  </a:moveTo>
+                  <a:cubicBezTo>
+                    <a:pt x="331" y="221"/>
+                    <a:pt x="0" y="1039"/>
+                    <a:pt x="435" y="1440"/>
+                  </a:cubicBezTo>
+                </a:path>
+              </a:pathLst>
+            </a:custGeom>
+            <a:noFill/>
+            <a:ln w="9525" cap="flat">
+              <a:solidFill>
+                <a:schemeClr val="bg1">
+                  <a:alpha val="35000"/>
+                </a:schemeClr>
+              </a:solidFill>
+              <a:prstDash val="solid"/>
+              <a:miter lim="800000"/>
+              <a:headEnd/>
+              <a:tailEnd/>
+            </a:ln>
+            <a:extLst>
+              <a:ext uri="{909E8E84-426E-40DD-AFC4-6F175D3DCCD1}">
+                <a14:hiddenFill xmlns:a14="http://schemas.microsoft.com/office/drawing/2010/main">
+                  <a:solidFill>
+                    <a:srgbClr val="FFFFFF"/>
+                  </a:solidFill>
+                </a14:hiddenFill>
+              </a:ext>
+            </a:extLst>
+          </p:spPr>
+        </p:sp>
+        <p:sp>
+          <p:nvSpPr>
+            <p:cNvPr id="36" name="Freeform 6">
+              <a:extLst>
+                <a:ext uri="{FF2B5EF4-FFF2-40B4-BE49-F238E27FC236}">
+                  <a16:creationId xmlns:a16="http://schemas.microsoft.com/office/drawing/2014/main" id="{BE054536-C03E-4857-B4AE-D687A58F9A9F}"/>
+                </a:ext>
+                <a:ext uri="{C183D7F6-B498-43B3-948B-1728B52AA6E4}">
+                  <adec:decorative xmlns:adec="http://schemas.microsoft.com/office/drawing/2017/decorative" val="1"/>
+                </a:ext>
+              </a:extLst>
+            </p:cNvPr>
+            <p:cNvSpPr/>
+            <p:nvPr>
+              <p:extLst>
+                <p:ext uri="{386F3935-93C4-4BCD-93E2-E3B085C9AB24}">
+                  <p16:designElem xmlns:p16="http://schemas.microsoft.com/office/powerpoint/2015/main" val="1"/>
+                </p:ext>
+              </p:extLst>
+            </p:nvPr>
+          </p:nvSpPr>
+          <p:spPr bwMode="auto">
+            <a:xfrm>
+              <a:off x="10626725" y="9525"/>
+              <a:ext cx="1539875" cy="555625"/>
+            </a:xfrm>
+            <a:custGeom>
+              <a:avLst/>
+              <a:gdLst/>
+              <a:ahLst/>
+              <a:cxnLst/>
+              <a:rect l="0" t="0" r="r" b="b"/>
+              <a:pathLst>
+                <a:path w="324" h="117">
+                  <a:moveTo>
+                    <a:pt x="324" y="117"/>
+                  </a:moveTo>
+                  <a:cubicBezTo>
+                    <a:pt x="223" y="64"/>
+                    <a:pt x="107" y="28"/>
+                    <a:pt x="0" y="0"/>
+                  </a:cubicBezTo>
+                </a:path>
+              </a:pathLst>
+            </a:custGeom>
+            <a:noFill/>
+            <a:ln w="9525" cap="flat">
+              <a:solidFill>
+                <a:schemeClr val="bg1">
+                  <a:alpha val="35000"/>
+                </a:schemeClr>
+              </a:solidFill>
+              <a:prstDash val="solid"/>
+              <a:miter lim="800000"/>
+              <a:headEnd/>
+              <a:tailEnd/>
+            </a:ln>
+            <a:extLst>
+              <a:ext uri="{909E8E84-426E-40DD-AFC4-6F175D3DCCD1}">
+                <a14:hiddenFill xmlns:a14="http://schemas.microsoft.com/office/drawing/2010/main">
+                  <a:solidFill>
+                    <a:srgbClr val="FFFFFF"/>
+                  </a:solidFill>
+                </a14:hiddenFill>
+              </a:ext>
+            </a:extLst>
+          </p:spPr>
+        </p:sp>
+        <p:sp>
+          <p:nvSpPr>
+            <p:cNvPr id="13" name="Freeform 7">
+              <a:extLst>
+                <a:ext uri="{FF2B5EF4-FFF2-40B4-BE49-F238E27FC236}">
+                  <a16:creationId xmlns:a16="http://schemas.microsoft.com/office/drawing/2014/main" id="{FE33E51C-23D8-43F5-98C4-A2ED2C4C99C7}"/>
+                </a:ext>
+                <a:ext uri="{C183D7F6-B498-43B3-948B-1728B52AA6E4}">
+                  <adec:decorative xmlns:adec="http://schemas.microsoft.com/office/drawing/2017/decorative" val="1"/>
+                </a:ext>
+              </a:extLst>
+            </p:cNvPr>
+            <p:cNvSpPr/>
+            <p:nvPr>
+              <p:extLst>
+                <p:ext uri="{386F3935-93C4-4BCD-93E2-E3B085C9AB24}">
+                  <p16:designElem xmlns:p16="http://schemas.microsoft.com/office/powerpoint/2015/main" val="1"/>
+                </p:ext>
+              </p:extLst>
+            </p:nvPr>
+          </p:nvSpPr>
+          <p:spPr bwMode="auto">
+            <a:xfrm>
+              <a:off x="10247313" y="5013325"/>
+              <a:ext cx="1919288" cy="1830388"/>
+            </a:xfrm>
+            <a:custGeom>
+              <a:avLst/>
+              <a:gdLst/>
+              <a:ahLst/>
+              <a:cxnLst/>
+              <a:rect l="0" t="0" r="r" b="b"/>
+              <a:pathLst>
+                <a:path w="404" h="385">
+                  <a:moveTo>
+                    <a:pt x="0" y="385"/>
+                  </a:moveTo>
+                  <a:cubicBezTo>
+                    <a:pt x="146" y="272"/>
+                    <a:pt x="285" y="142"/>
+                    <a:pt x="404" y="0"/>
+                  </a:cubicBezTo>
+                </a:path>
+              </a:pathLst>
+            </a:custGeom>
+            <a:noFill/>
+            <a:ln w="9525" cap="flat">
+              <a:solidFill>
+                <a:schemeClr val="bg1">
+                  <a:alpha val="35000"/>
+                </a:schemeClr>
+              </a:solidFill>
+              <a:prstDash val="solid"/>
+              <a:miter lim="800000"/>
+              <a:headEnd/>
+              <a:tailEnd/>
+            </a:ln>
+            <a:extLst>
+              <a:ext uri="{909E8E84-426E-40DD-AFC4-6F175D3DCCD1}">
+                <a14:hiddenFill xmlns:a14="http://schemas.microsoft.com/office/drawing/2010/main">
+                  <a:solidFill>
+                    <a:srgbClr val="FFFFFF"/>
+                  </a:solidFill>
+                </a14:hiddenFill>
+              </a:ext>
+            </a:extLst>
+          </p:spPr>
+        </p:sp>
+        <p:sp>
+          <p:nvSpPr>
+            <p:cNvPr id="37" name="Freeform 8">
+              <a:extLst>
+                <a:ext uri="{FF2B5EF4-FFF2-40B4-BE49-F238E27FC236}">
+                  <a16:creationId xmlns:a16="http://schemas.microsoft.com/office/drawing/2014/main" id="{89E18891-DEB2-4CFD-A907-2868B2A91055}"/>
+                </a:ext>
+                <a:ext uri="{C183D7F6-B498-43B3-948B-1728B52AA6E4}">
+                  <adec:decorative xmlns:adec="http://schemas.microsoft.com/office/drawing/2017/decorative" val="1"/>
+                </a:ext>
+              </a:extLst>
+            </p:cNvPr>
+            <p:cNvSpPr/>
+            <p:nvPr>
+              <p:extLst>
+                <p:ext uri="{386F3935-93C4-4BCD-93E2-E3B085C9AB24}">
+                  <p16:designElem xmlns:p16="http://schemas.microsoft.com/office/powerpoint/2015/main" val="1"/>
+                </p:ext>
+              </p:extLst>
+            </p:nvPr>
+          </p:nvSpPr>
+          <p:spPr bwMode="auto">
+            <a:xfrm>
+              <a:off x="1120775" y="0"/>
+              <a:ext cx="3676650" cy="6843713"/>
+            </a:xfrm>
+            <a:custGeom>
+              <a:avLst/>
+              <a:gdLst/>
+              <a:ahLst/>
+              <a:cxnLst/>
+              <a:rect l="0" t="0" r="r" b="b"/>
+              <a:pathLst>
+                <a:path w="774" h="1440">
+                  <a:moveTo>
+                    <a:pt x="774" y="0"/>
+                  </a:moveTo>
+                  <a:cubicBezTo>
+                    <a:pt x="312" y="240"/>
+                    <a:pt x="0" y="1034"/>
+                    <a:pt x="411" y="1440"/>
+                  </a:cubicBezTo>
+                </a:path>
+              </a:pathLst>
+            </a:custGeom>
+            <a:noFill/>
+            <a:ln w="9525" cap="flat">
+              <a:solidFill>
+                <a:schemeClr val="bg1">
+                  <a:alpha val="35000"/>
+                </a:schemeClr>
+              </a:solidFill>
+              <a:prstDash val="dash"/>
+              <a:miter lim="800000"/>
+              <a:headEnd/>
+              <a:tailEnd/>
+            </a:ln>
+            <a:extLst>
+              <a:ext uri="{909E8E84-426E-40DD-AFC4-6F175D3DCCD1}">
+                <a14:hiddenFill xmlns:a14="http://schemas.microsoft.com/office/drawing/2010/main">
+                  <a:solidFill>
+                    <a:srgbClr val="FFFFFF"/>
+                  </a:solidFill>
+                </a14:hiddenFill>
+              </a:ext>
+            </a:extLst>
+          </p:spPr>
+        </p:sp>
+        <p:sp>
+          <p:nvSpPr>
+            <p:cNvPr id="15" name="Freeform 9">
+              <a:extLst>
+                <a:ext uri="{FF2B5EF4-FFF2-40B4-BE49-F238E27FC236}">
+                  <a16:creationId xmlns:a16="http://schemas.microsoft.com/office/drawing/2014/main" id="{0002C1BB-DB60-4314-A2FC-203E54D94C78}"/>
+                </a:ext>
+                <a:ext uri="{C183D7F6-B498-43B3-948B-1728B52AA6E4}">
+                  <adec:decorative xmlns:adec="http://schemas.microsoft.com/office/drawing/2017/decorative" val="1"/>
+                </a:ext>
+              </a:extLst>
+            </p:cNvPr>
+            <p:cNvSpPr/>
+            <p:nvPr>
+              <p:extLst>
+                <p:ext uri="{386F3935-93C4-4BCD-93E2-E3B085C9AB24}">
+                  <p16:designElem xmlns:p16="http://schemas.microsoft.com/office/powerpoint/2015/main" val="1"/>
+                </p:ext>
+              </p:extLst>
+            </p:nvPr>
+          </p:nvSpPr>
+          <p:spPr bwMode="auto">
+            <a:xfrm>
+              <a:off x="11202988" y="9525"/>
+              <a:ext cx="963613" cy="366713"/>
+            </a:xfrm>
+            <a:custGeom>
+              <a:avLst/>
+              <a:gdLst/>
+              <a:ahLst/>
+              <a:cxnLst/>
+              <a:rect l="0" t="0" r="r" b="b"/>
+              <a:pathLst>
+                <a:path w="203" h="77">
+                  <a:moveTo>
+                    <a:pt x="203" y="77"/>
+                  </a:moveTo>
+                  <a:cubicBezTo>
+                    <a:pt x="138" y="46"/>
+                    <a:pt x="68" y="21"/>
+                    <a:pt x="0" y="0"/>
+                  </a:cubicBezTo>
+                </a:path>
+              </a:pathLst>
+            </a:custGeom>
+            <a:noFill/>
+            <a:ln w="9525" cap="flat">
+              <a:solidFill>
+                <a:schemeClr val="bg1">
+                  <a:alpha val="35000"/>
+                </a:schemeClr>
+              </a:solidFill>
+              <a:prstDash val="dash"/>
+              <a:miter lim="800000"/>
+              <a:headEnd/>
+              <a:tailEnd/>
+            </a:ln>
+            <a:extLst>
+              <a:ext uri="{909E8E84-426E-40DD-AFC4-6F175D3DCCD1}">
+                <a14:hiddenFill xmlns:a14="http://schemas.microsoft.com/office/drawing/2010/main">
+                  <a:solidFill>
+                    <a:srgbClr val="FFFFFF"/>
+                  </a:solidFill>
+                </a14:hiddenFill>
+              </a:ext>
+            </a:extLst>
+          </p:spPr>
+        </p:sp>
+        <p:sp>
+          <p:nvSpPr>
+            <p:cNvPr id="38" name="Freeform 10">
+              <a:extLst>
+                <a:ext uri="{FF2B5EF4-FFF2-40B4-BE49-F238E27FC236}">
+                  <a16:creationId xmlns:a16="http://schemas.microsoft.com/office/drawing/2014/main" id="{9B75BDFA-6D78-4FB1-9F21-5280855C49F8}"/>
+                </a:ext>
+                <a:ext uri="{C183D7F6-B498-43B3-948B-1728B52AA6E4}">
+                  <adec:decorative xmlns:adec="http://schemas.microsoft.com/office/drawing/2017/decorative" val="1"/>
+                </a:ext>
+              </a:extLst>
+            </p:cNvPr>
+            <p:cNvSpPr/>
+            <p:nvPr>
+              <p:extLst>
+                <p:ext uri="{386F3935-93C4-4BCD-93E2-E3B085C9AB24}">
+                  <p16:designElem xmlns:p16="http://schemas.microsoft.com/office/powerpoint/2015/main" val="1"/>
+                </p:ext>
+              </p:extLst>
+            </p:nvPr>
+          </p:nvSpPr>
+          <p:spPr bwMode="auto">
+            <a:xfrm>
+              <a:off x="10494963" y="5275263"/>
+              <a:ext cx="1666875" cy="1577975"/>
+            </a:xfrm>
+            <a:custGeom>
+              <a:avLst/>
+              <a:gdLst/>
+              <a:ahLst/>
+              <a:cxnLst/>
+              <a:rect l="0" t="0" r="r" b="b"/>
+              <a:pathLst>
+                <a:path w="351" h="332">
+                  <a:moveTo>
+                    <a:pt x="0" y="332"/>
+                  </a:moveTo>
+                  <a:cubicBezTo>
+                    <a:pt x="125" y="232"/>
+                    <a:pt x="245" y="121"/>
+                    <a:pt x="351" y="0"/>
+                  </a:cubicBezTo>
+                </a:path>
+              </a:pathLst>
+            </a:custGeom>
+            <a:noFill/>
+            <a:ln w="9525" cap="flat">
+              <a:solidFill>
+                <a:schemeClr val="bg1">
+                  <a:alpha val="35000"/>
+                </a:schemeClr>
+              </a:solidFill>
+              <a:prstDash val="dash"/>
+              <a:miter lim="800000"/>
+              <a:headEnd/>
+              <a:tailEnd/>
+            </a:ln>
+            <a:extLst>
+              <a:ext uri="{909E8E84-426E-40DD-AFC4-6F175D3DCCD1}">
+                <a14:hiddenFill xmlns:a14="http://schemas.microsoft.com/office/drawing/2010/main">
+                  <a:solidFill>
+                    <a:srgbClr val="FFFFFF"/>
+                  </a:solidFill>
+                </a14:hiddenFill>
+              </a:ext>
+            </a:extLst>
+          </p:spPr>
+        </p:sp>
+        <p:sp>
+          <p:nvSpPr>
+            <p:cNvPr id="17" name="Freeform 11">
+              <a:extLst>
+                <a:ext uri="{FF2B5EF4-FFF2-40B4-BE49-F238E27FC236}">
+                  <a16:creationId xmlns:a16="http://schemas.microsoft.com/office/drawing/2014/main" id="{0B632D6B-A327-41AB-BBCF-9A03AD2AB738}"/>
+                </a:ext>
+                <a:ext uri="{C183D7F6-B498-43B3-948B-1728B52AA6E4}">
+                  <adec:decorative xmlns:adec="http://schemas.microsoft.com/office/drawing/2017/decorative" val="1"/>
+                </a:ext>
+              </a:extLst>
+            </p:cNvPr>
+            <p:cNvSpPr/>
+            <p:nvPr>
+              <p:extLst>
+                <p:ext uri="{386F3935-93C4-4BCD-93E2-E3B085C9AB24}">
+                  <p16:designElem xmlns:p16="http://schemas.microsoft.com/office/powerpoint/2015/main" val="1"/>
+                </p:ext>
+              </p:extLst>
+            </p:nvPr>
+          </p:nvSpPr>
+          <p:spPr bwMode="auto">
+            <a:xfrm>
+              <a:off x="1001713" y="0"/>
+              <a:ext cx="3621088" cy="6843713"/>
+            </a:xfrm>
+            <a:custGeom>
+              <a:avLst/>
+              <a:gdLst/>
+              <a:ahLst/>
+              <a:cxnLst/>
+              <a:rect l="0" t="0" r="r" b="b"/>
+              <a:pathLst>
+                <a:path w="762" h="1440">
+                  <a:moveTo>
+                    <a:pt x="762" y="0"/>
+                  </a:moveTo>
+                  <a:cubicBezTo>
+                    <a:pt x="308" y="245"/>
+                    <a:pt x="0" y="1033"/>
+                    <a:pt x="403" y="1440"/>
+                  </a:cubicBezTo>
+                </a:path>
+              </a:pathLst>
+            </a:custGeom>
+            <a:noFill/>
+            <a:ln w="9525" cap="flat">
+              <a:solidFill>
+                <a:schemeClr val="bg1">
+                  <a:alpha val="35000"/>
+                </a:schemeClr>
+              </a:solidFill>
+              <a:prstDash val="solid"/>
+              <a:miter lim="800000"/>
+              <a:headEnd/>
+              <a:tailEnd/>
+            </a:ln>
+            <a:extLst>
+              <a:ext uri="{909E8E84-426E-40DD-AFC4-6F175D3DCCD1}">
+                <a14:hiddenFill xmlns:a14="http://schemas.microsoft.com/office/drawing/2010/main">
+                  <a:solidFill>
+                    <a:srgbClr val="FFFFFF"/>
+                  </a:solidFill>
+                </a14:hiddenFill>
+              </a:ext>
+            </a:extLst>
+          </p:spPr>
+        </p:sp>
+        <p:sp>
+          <p:nvSpPr>
+            <p:cNvPr id="18" name="Freeform 12">
+              <a:extLst>
+                <a:ext uri="{FF2B5EF4-FFF2-40B4-BE49-F238E27FC236}">
+                  <a16:creationId xmlns:a16="http://schemas.microsoft.com/office/drawing/2014/main" id="{F514BBC5-1736-4813-BECB-5A6B6738E587}"/>
+                </a:ext>
+                <a:ext uri="{C183D7F6-B498-43B3-948B-1728B52AA6E4}">
+                  <adec:decorative xmlns:adec="http://schemas.microsoft.com/office/drawing/2017/decorative" val="1"/>
+                </a:ext>
+              </a:extLst>
+            </p:cNvPr>
+            <p:cNvSpPr/>
+            <p:nvPr>
+              <p:extLst>
+                <p:ext uri="{386F3935-93C4-4BCD-93E2-E3B085C9AB24}">
+                  <p16:designElem xmlns:p16="http://schemas.microsoft.com/office/powerpoint/2015/main" val="1"/>
+                </p:ext>
+              </p:extLst>
+            </p:nvPr>
+          </p:nvSpPr>
+          <p:spPr bwMode="auto">
+            <a:xfrm>
+              <a:off x="11501438" y="9525"/>
+              <a:ext cx="665163" cy="257175"/>
+            </a:xfrm>
+            <a:custGeom>
+              <a:avLst/>
+              <a:gdLst/>
+              <a:ahLst/>
+              <a:cxnLst/>
+              <a:rect l="0" t="0" r="r" b="b"/>
+              <a:pathLst>
+                <a:path w="140" h="54">
+                  <a:moveTo>
+                    <a:pt x="140" y="54"/>
+                  </a:moveTo>
+                  <a:cubicBezTo>
+                    <a:pt x="95" y="34"/>
+                    <a:pt x="48" y="16"/>
+                    <a:pt x="0" y="0"/>
+                  </a:cubicBezTo>
+                </a:path>
+              </a:pathLst>
+            </a:custGeom>
+            <a:noFill/>
+            <a:ln w="9525" cap="flat">
+              <a:solidFill>
+                <a:schemeClr val="bg1">
+                  <a:alpha val="35000"/>
+                </a:schemeClr>
+              </a:solidFill>
+              <a:prstDash val="solid"/>
+              <a:miter lim="800000"/>
+              <a:headEnd/>
+              <a:tailEnd/>
+            </a:ln>
+            <a:extLst>
+              <a:ext uri="{909E8E84-426E-40DD-AFC4-6F175D3DCCD1}">
+                <a14:hiddenFill xmlns:a14="http://schemas.microsoft.com/office/drawing/2010/main">
+                  <a:solidFill>
+                    <a:srgbClr val="FFFFFF"/>
+                  </a:solidFill>
+                </a14:hiddenFill>
+              </a:ext>
+            </a:extLst>
+          </p:spPr>
+        </p:sp>
+        <p:sp>
+          <p:nvSpPr>
+            <p:cNvPr id="19" name="Freeform 13">
+              <a:extLst>
+                <a:ext uri="{FF2B5EF4-FFF2-40B4-BE49-F238E27FC236}">
+                  <a16:creationId xmlns:a16="http://schemas.microsoft.com/office/drawing/2014/main" id="{94A2C868-7AEC-4209-BFA3-7185B11D330C}"/>
+                </a:ext>
+                <a:ext uri="{C183D7F6-B498-43B3-948B-1728B52AA6E4}">
+                  <adec:decorative xmlns:adec="http://schemas.microsoft.com/office/drawing/2017/decorative" val="1"/>
+                </a:ext>
+              </a:extLst>
+            </p:cNvPr>
+            <p:cNvSpPr/>
+            <p:nvPr>
+              <p:extLst>
+                <p:ext uri="{386F3935-93C4-4BCD-93E2-E3B085C9AB24}">
+                  <p16:designElem xmlns:p16="http://schemas.microsoft.com/office/powerpoint/2015/main" val="1"/>
+                </p:ext>
+              </p:extLst>
+            </p:nvPr>
+          </p:nvSpPr>
+          <p:spPr bwMode="auto">
+            <a:xfrm>
+              <a:off x="10641013" y="5408613"/>
+              <a:ext cx="1525588" cy="1435100"/>
+            </a:xfrm>
+            <a:custGeom>
+              <a:avLst/>
+              <a:gdLst/>
+              <a:ahLst/>
+              <a:cxnLst/>
+              <a:rect l="0" t="0" r="r" b="b"/>
+              <a:pathLst>
+                <a:path w="321" h="302">
+                  <a:moveTo>
+                    <a:pt x="0" y="302"/>
+                  </a:moveTo>
+                  <a:cubicBezTo>
+                    <a:pt x="114" y="210"/>
+                    <a:pt x="223" y="109"/>
+                    <a:pt x="321" y="0"/>
+                  </a:cubicBezTo>
+                </a:path>
+              </a:pathLst>
+            </a:custGeom>
+            <a:noFill/>
+            <a:ln w="9525" cap="flat">
+              <a:solidFill>
+                <a:schemeClr val="bg1">
+                  <a:alpha val="35000"/>
+                </a:schemeClr>
+              </a:solidFill>
+              <a:prstDash val="solid"/>
+              <a:miter lim="800000"/>
+              <a:headEnd/>
+              <a:tailEnd/>
+            </a:ln>
+            <a:extLst>
+              <a:ext uri="{909E8E84-426E-40DD-AFC4-6F175D3DCCD1}">
+                <a14:hiddenFill xmlns:a14="http://schemas.microsoft.com/office/drawing/2010/main">
+                  <a:solidFill>
+                    <a:srgbClr val="FFFFFF"/>
+                  </a:solidFill>
+                </a14:hiddenFill>
+              </a:ext>
+            </a:extLst>
+          </p:spPr>
+        </p:sp>
+        <p:sp>
+          <p:nvSpPr>
+            <p:cNvPr id="20" name="Freeform 14">
+              <a:extLst>
+                <a:ext uri="{FF2B5EF4-FFF2-40B4-BE49-F238E27FC236}">
+                  <a16:creationId xmlns:a16="http://schemas.microsoft.com/office/drawing/2014/main" id="{FF56CB70-2B25-4695-ADC8-6092D0D1129B}"/>
+                </a:ext>
+                <a:ext uri="{C183D7F6-B498-43B3-948B-1728B52AA6E4}">
+                  <adec:decorative xmlns:adec="http://schemas.microsoft.com/office/drawing/2017/decorative" val="1"/>
+                </a:ext>
+              </a:extLst>
+            </p:cNvPr>
+            <p:cNvSpPr/>
+            <p:nvPr>
+              <p:extLst>
+                <p:ext uri="{386F3935-93C4-4BCD-93E2-E3B085C9AB24}">
+                  <p16:designElem xmlns:p16="http://schemas.microsoft.com/office/powerpoint/2015/main" val="1"/>
+                </p:ext>
+              </p:extLst>
+            </p:nvPr>
+          </p:nvSpPr>
+          <p:spPr bwMode="auto">
+            <a:xfrm>
+              <a:off x="1001713" y="0"/>
+              <a:ext cx="3244850" cy="6843713"/>
+            </a:xfrm>
+            <a:custGeom>
+              <a:avLst/>
+              <a:gdLst/>
+              <a:ahLst/>
+              <a:cxnLst/>
+              <a:rect l="0" t="0" r="r" b="b"/>
+              <a:pathLst>
+                <a:path w="683" h="1440">
+                  <a:moveTo>
+                    <a:pt x="683" y="0"/>
+                  </a:moveTo>
+                  <a:cubicBezTo>
+                    <a:pt x="258" y="256"/>
+                    <a:pt x="0" y="1041"/>
+                    <a:pt x="355" y="1440"/>
+                  </a:cubicBezTo>
+                </a:path>
+              </a:pathLst>
+            </a:custGeom>
+            <a:noFill/>
+            <a:ln w="9525" cap="flat">
+              <a:solidFill>
+                <a:schemeClr val="bg1">
+                  <a:alpha val="35000"/>
+                </a:schemeClr>
+              </a:solidFill>
+              <a:prstDash val="solid"/>
+              <a:miter lim="800000"/>
+              <a:headEnd/>
+              <a:tailEnd/>
+            </a:ln>
+            <a:extLst>
+              <a:ext uri="{909E8E84-426E-40DD-AFC4-6F175D3DCCD1}">
+                <a14:hiddenFill xmlns:a14="http://schemas.microsoft.com/office/drawing/2010/main">
+                  <a:solidFill>
+                    <a:srgbClr val="FFFFFF"/>
+                  </a:solidFill>
+                </a14:hiddenFill>
+              </a:ext>
+            </a:extLst>
+          </p:spPr>
+        </p:sp>
+        <p:sp>
+          <p:nvSpPr>
+            <p:cNvPr id="21" name="Freeform 15">
+              <a:extLst>
+                <a:ext uri="{FF2B5EF4-FFF2-40B4-BE49-F238E27FC236}">
+                  <a16:creationId xmlns:a16="http://schemas.microsoft.com/office/drawing/2014/main" id="{BA411BEF-2182-4458-B9AF-1634B5C23168}"/>
+                </a:ext>
+                <a:ext uri="{C183D7F6-B498-43B3-948B-1728B52AA6E4}">
+                  <adec:decorative xmlns:adec="http://schemas.microsoft.com/office/drawing/2017/decorative" val="1"/>
+                </a:ext>
+              </a:extLst>
+            </p:cNvPr>
+            <p:cNvSpPr/>
+            <p:nvPr>
+              <p:extLst>
+                <p:ext uri="{386F3935-93C4-4BCD-93E2-E3B085C9AB24}">
+                  <p16:designElem xmlns:p16="http://schemas.microsoft.com/office/powerpoint/2015/main" val="1"/>
+                </p:ext>
+              </p:extLst>
+            </p:nvPr>
+          </p:nvSpPr>
+          <p:spPr bwMode="auto">
+            <a:xfrm>
+              <a:off x="10802938" y="5518150"/>
+              <a:ext cx="1363663" cy="1325563"/>
+            </a:xfrm>
+            <a:custGeom>
+              <a:avLst/>
+              <a:gdLst/>
+              <a:ahLst/>
+              <a:cxnLst/>
+              <a:rect l="0" t="0" r="r" b="b"/>
+              <a:pathLst>
+                <a:path w="287" h="279">
+                  <a:moveTo>
+                    <a:pt x="0" y="279"/>
+                  </a:moveTo>
+                  <a:cubicBezTo>
+                    <a:pt x="101" y="193"/>
+                    <a:pt x="198" y="100"/>
+                    <a:pt x="287" y="0"/>
+                  </a:cubicBezTo>
+                </a:path>
+              </a:pathLst>
+            </a:custGeom>
+            <a:noFill/>
+            <a:ln w="9525" cap="flat">
+              <a:solidFill>
+                <a:schemeClr val="bg1">
+                  <a:alpha val="35000"/>
+                </a:schemeClr>
+              </a:solidFill>
+              <a:prstDash val="solid"/>
+              <a:miter lim="800000"/>
+              <a:headEnd/>
+              <a:tailEnd/>
+            </a:ln>
+            <a:extLst>
+              <a:ext uri="{909E8E84-426E-40DD-AFC4-6F175D3DCCD1}">
+                <a14:hiddenFill xmlns:a14="http://schemas.microsoft.com/office/drawing/2010/main">
+                  <a:solidFill>
+                    <a:srgbClr val="FFFFFF"/>
+                  </a:solidFill>
+                </a14:hiddenFill>
+              </a:ext>
+            </a:extLst>
+          </p:spPr>
+        </p:sp>
+        <p:sp>
+          <p:nvSpPr>
+            <p:cNvPr id="22" name="Freeform 16">
+              <a:extLst>
+                <a:ext uri="{FF2B5EF4-FFF2-40B4-BE49-F238E27FC236}">
+                  <a16:creationId xmlns:a16="http://schemas.microsoft.com/office/drawing/2014/main" id="{53F27E63-3F11-4C85-AC72-1EE8508C4C42}"/>
+                </a:ext>
+                <a:ext uri="{C183D7F6-B498-43B3-948B-1728B52AA6E4}">
+                  <adec:decorative xmlns:adec="http://schemas.microsoft.com/office/drawing/2017/decorative" val="1"/>
+                </a:ext>
+              </a:extLst>
+            </p:cNvPr>
+            <p:cNvSpPr/>
+            <p:nvPr>
+              <p:extLst>
+                <p:ext uri="{386F3935-93C4-4BCD-93E2-E3B085C9AB24}">
+                  <p16:designElem xmlns:p16="http://schemas.microsoft.com/office/powerpoint/2015/main" val="1"/>
+                </p:ext>
+              </p:extLst>
+            </p:nvPr>
+          </p:nvSpPr>
+          <p:spPr bwMode="auto">
+            <a:xfrm>
+              <a:off x="889000" y="0"/>
+              <a:ext cx="3230563" cy="6843713"/>
+            </a:xfrm>
+            <a:custGeom>
+              <a:avLst/>
+              <a:gdLst/>
+              <a:ahLst/>
+              <a:cxnLst/>
+              <a:rect l="0" t="0" r="r" b="b"/>
+              <a:pathLst>
+                <a:path w="680" h="1440">
+                  <a:moveTo>
+                    <a:pt x="680" y="0"/>
+                  </a:moveTo>
+                  <a:cubicBezTo>
+                    <a:pt x="257" y="265"/>
+                    <a:pt x="0" y="1026"/>
+                    <a:pt x="337" y="1440"/>
+                  </a:cubicBezTo>
+                </a:path>
+              </a:pathLst>
+            </a:custGeom>
+            <a:noFill/>
+            <a:ln w="9525" cap="flat">
+              <a:solidFill>
+                <a:schemeClr val="bg1">
+                  <a:alpha val="35000"/>
+                </a:schemeClr>
+              </a:solidFill>
+              <a:prstDash val="solid"/>
+              <a:miter lim="800000"/>
+              <a:headEnd/>
+              <a:tailEnd/>
+            </a:ln>
+            <a:extLst>
+              <a:ext uri="{909E8E84-426E-40DD-AFC4-6F175D3DCCD1}">
+                <a14:hiddenFill xmlns:a14="http://schemas.microsoft.com/office/drawing/2010/main">
+                  <a:solidFill>
+                    <a:srgbClr val="FFFFFF"/>
+                  </a:solidFill>
+                </a14:hiddenFill>
+              </a:ext>
+            </a:extLst>
+          </p:spPr>
+        </p:sp>
+        <p:sp>
+          <p:nvSpPr>
+            <p:cNvPr id="23" name="Freeform 17">
+              <a:extLst>
+                <a:ext uri="{FF2B5EF4-FFF2-40B4-BE49-F238E27FC236}">
+                  <a16:creationId xmlns:a16="http://schemas.microsoft.com/office/drawing/2014/main" id="{68B589BA-F70F-4E0B-94B9-EEB83EDF3F2F}"/>
+                </a:ext>
+                <a:ext uri="{C183D7F6-B498-43B3-948B-1728B52AA6E4}">
+                  <adec:decorative xmlns:adec="http://schemas.microsoft.com/office/drawing/2017/decorative" val="1"/>
+                </a:ext>
+              </a:extLst>
+            </p:cNvPr>
+            <p:cNvSpPr/>
+            <p:nvPr>
+              <p:extLst>
+                <p:ext uri="{386F3935-93C4-4BCD-93E2-E3B085C9AB24}">
+                  <p16:designElem xmlns:p16="http://schemas.microsoft.com/office/powerpoint/2015/main" val="1"/>
+                </p:ext>
+              </p:extLst>
+            </p:nvPr>
+          </p:nvSpPr>
+          <p:spPr bwMode="auto">
+            <a:xfrm>
+              <a:off x="10979150" y="5694363"/>
+              <a:ext cx="1187450" cy="1149350"/>
+            </a:xfrm>
+            <a:custGeom>
+              <a:avLst/>
+              <a:gdLst/>
+              <a:ahLst/>
+              <a:cxnLst/>
+              <a:rect l="0" t="0" r="r" b="b"/>
+              <a:pathLst>
+                <a:path w="250" h="242">
+                  <a:moveTo>
+                    <a:pt x="0" y="242"/>
+                  </a:moveTo>
+                  <a:cubicBezTo>
+                    <a:pt x="88" y="166"/>
+                    <a:pt x="172" y="85"/>
+                    <a:pt x="250" y="0"/>
+                  </a:cubicBezTo>
+                </a:path>
+              </a:pathLst>
+            </a:custGeom>
+            <a:noFill/>
+            <a:ln w="9525" cap="flat">
+              <a:solidFill>
+                <a:schemeClr val="bg1">
+                  <a:alpha val="35000"/>
+                </a:schemeClr>
+              </a:solidFill>
+              <a:prstDash val="solid"/>
+              <a:miter lim="800000"/>
+              <a:headEnd/>
+              <a:tailEnd/>
+            </a:ln>
+            <a:extLst>
+              <a:ext uri="{909E8E84-426E-40DD-AFC4-6F175D3DCCD1}">
+                <a14:hiddenFill xmlns:a14="http://schemas.microsoft.com/office/drawing/2010/main">
+                  <a:solidFill>
+                    <a:srgbClr val="FFFFFF"/>
+                  </a:solidFill>
+                </a14:hiddenFill>
+              </a:ext>
+            </a:extLst>
+          </p:spPr>
+        </p:sp>
+        <p:sp>
+          <p:nvSpPr>
+            <p:cNvPr id="24" name="Freeform 18">
+              <a:extLst>
+                <a:ext uri="{FF2B5EF4-FFF2-40B4-BE49-F238E27FC236}">
+                  <a16:creationId xmlns:a16="http://schemas.microsoft.com/office/drawing/2014/main" id="{9D0B991D-CB0A-415F-8D77-A5565F66F0EA}"/>
+                </a:ext>
+                <a:ext uri="{C183D7F6-B498-43B3-948B-1728B52AA6E4}">
+                  <adec:decorative xmlns:adec="http://schemas.microsoft.com/office/drawing/2017/decorative" val="1"/>
+                </a:ext>
+              </a:extLst>
+            </p:cNvPr>
+            <p:cNvSpPr/>
+            <p:nvPr>
+              <p:extLst>
+                <p:ext uri="{386F3935-93C4-4BCD-93E2-E3B085C9AB24}">
+                  <p16:designElem xmlns:p16="http://schemas.microsoft.com/office/powerpoint/2015/main" val="1"/>
+                </p:ext>
+              </p:extLst>
+            </p:nvPr>
+          </p:nvSpPr>
+          <p:spPr bwMode="auto">
+            <a:xfrm>
+              <a:off x="484188" y="0"/>
+              <a:ext cx="3421063" cy="6843713"/>
+            </a:xfrm>
+            <a:custGeom>
+              <a:avLst/>
+              <a:gdLst/>
+              <a:ahLst/>
+              <a:cxnLst/>
+              <a:rect l="0" t="0" r="r" b="b"/>
+              <a:pathLst>
+                <a:path w="720" h="1440">
+                  <a:moveTo>
+                    <a:pt x="720" y="0"/>
+                  </a:moveTo>
+                  <a:cubicBezTo>
+                    <a:pt x="316" y="282"/>
+                    <a:pt x="0" y="1018"/>
+                    <a:pt x="362" y="1440"/>
+                  </a:cubicBezTo>
+                </a:path>
+              </a:pathLst>
+            </a:custGeom>
+            <a:noFill/>
+            <a:ln w="9525" cap="flat">
+              <a:solidFill>
+                <a:schemeClr val="bg1">
+                  <a:alpha val="35000"/>
+                </a:schemeClr>
+              </a:solidFill>
+              <a:prstDash val="solid"/>
+              <a:miter lim="800000"/>
+              <a:headEnd/>
+              <a:tailEnd/>
+            </a:ln>
+            <a:extLst>
+              <a:ext uri="{909E8E84-426E-40DD-AFC4-6F175D3DCCD1}">
+                <a14:hiddenFill xmlns:a14="http://schemas.microsoft.com/office/drawing/2010/main">
+                  <a:solidFill>
+                    <a:srgbClr val="FFFFFF"/>
+                  </a:solidFill>
+                </a14:hiddenFill>
+              </a:ext>
+            </a:extLst>
+          </p:spPr>
+        </p:sp>
+        <p:sp>
+          <p:nvSpPr>
+            <p:cNvPr id="25" name="Freeform 19">
+              <a:extLst>
+                <a:ext uri="{FF2B5EF4-FFF2-40B4-BE49-F238E27FC236}">
+                  <a16:creationId xmlns:a16="http://schemas.microsoft.com/office/drawing/2014/main" id="{701E99DE-74F0-41D1-BBF4-5A57053BB6C0}"/>
+                </a:ext>
+                <a:ext uri="{C183D7F6-B498-43B3-948B-1728B52AA6E4}">
+                  <adec:decorative xmlns:adec="http://schemas.microsoft.com/office/drawing/2017/decorative" val="1"/>
+                </a:ext>
+              </a:extLst>
+            </p:cNvPr>
+            <p:cNvSpPr/>
+            <p:nvPr>
+              <p:extLst>
+                <p:ext uri="{386F3935-93C4-4BCD-93E2-E3B085C9AB24}">
+                  <p16:designElem xmlns:p16="http://schemas.microsoft.com/office/powerpoint/2015/main" val="1"/>
+                </p:ext>
+              </p:extLst>
+            </p:nvPr>
+          </p:nvSpPr>
+          <p:spPr bwMode="auto">
+            <a:xfrm>
+              <a:off x="11287125" y="6049963"/>
+              <a:ext cx="879475" cy="793750"/>
+            </a:xfrm>
+            <a:custGeom>
+              <a:avLst/>
+              <a:gdLst/>
+              <a:ahLst/>
+              <a:cxnLst/>
+              <a:rect l="0" t="0" r="r" b="b"/>
+              <a:pathLst>
+                <a:path w="185" h="167">
+                  <a:moveTo>
+                    <a:pt x="0" y="167"/>
+                  </a:moveTo>
+                  <a:cubicBezTo>
+                    <a:pt x="63" y="114"/>
+                    <a:pt x="125" y="58"/>
+                    <a:pt x="185" y="0"/>
+                  </a:cubicBezTo>
+                </a:path>
+              </a:pathLst>
+            </a:custGeom>
+            <a:noFill/>
+            <a:ln w="9525" cap="flat">
+              <a:solidFill>
+                <a:schemeClr val="bg1">
+                  <a:alpha val="35000"/>
+                </a:schemeClr>
+              </a:solidFill>
+              <a:prstDash val="solid"/>
+              <a:miter lim="800000"/>
+              <a:headEnd/>
+              <a:tailEnd/>
+            </a:ln>
+            <a:extLst>
+              <a:ext uri="{909E8E84-426E-40DD-AFC4-6F175D3DCCD1}">
+                <a14:hiddenFill xmlns:a14="http://schemas.microsoft.com/office/drawing/2010/main">
+                  <a:solidFill>
+                    <a:srgbClr val="FFFFFF"/>
+                  </a:solidFill>
+                </a14:hiddenFill>
+              </a:ext>
+            </a:extLst>
+          </p:spPr>
+        </p:sp>
+        <p:sp>
+          <p:nvSpPr>
+            <p:cNvPr id="26" name="Freeform 20">
+              <a:extLst>
+                <a:ext uri="{FF2B5EF4-FFF2-40B4-BE49-F238E27FC236}">
+                  <a16:creationId xmlns:a16="http://schemas.microsoft.com/office/drawing/2014/main" id="{C02EE40A-8F17-4182-9495-9506463B794E}"/>
+                </a:ext>
+                <a:ext uri="{C183D7F6-B498-43B3-948B-1728B52AA6E4}">
+                  <adec:decorative xmlns:adec="http://schemas.microsoft.com/office/drawing/2017/decorative" val="1"/>
+                </a:ext>
+              </a:extLst>
+            </p:cNvPr>
+            <p:cNvSpPr/>
+            <p:nvPr>
+              <p:extLst>
+                <p:ext uri="{386F3935-93C4-4BCD-93E2-E3B085C9AB24}">
+                  <p16:designElem xmlns:p16="http://schemas.microsoft.com/office/powerpoint/2015/main" val="1"/>
+                </p:ext>
+              </p:extLst>
+            </p:nvPr>
+          </p:nvSpPr>
+          <p:spPr bwMode="auto">
+            <a:xfrm>
+              <a:off x="598488" y="0"/>
+              <a:ext cx="2717800" cy="6843713"/>
+            </a:xfrm>
+            <a:custGeom>
+              <a:avLst/>
+              <a:gdLst/>
+              <a:ahLst/>
+              <a:cxnLst/>
+              <a:rect l="0" t="0" r="r" b="b"/>
+              <a:pathLst>
+                <a:path w="572" h="1440">
+                  <a:moveTo>
+                    <a:pt x="572" y="0"/>
+                  </a:moveTo>
+                  <a:cubicBezTo>
+                    <a:pt x="213" y="320"/>
+                    <a:pt x="0" y="979"/>
+                    <a:pt x="164" y="1440"/>
+                  </a:cubicBezTo>
+                </a:path>
+              </a:pathLst>
+            </a:custGeom>
+            <a:noFill/>
+            <a:ln w="12700" cap="flat">
+              <a:solidFill>
+                <a:schemeClr val="bg1">
+                  <a:alpha val="35000"/>
+                </a:schemeClr>
+              </a:solidFill>
+              <a:prstDash val="dashDot"/>
+              <a:miter lim="800000"/>
+              <a:headEnd/>
+              <a:tailEnd/>
+            </a:ln>
+            <a:extLst>
+              <a:ext uri="{909E8E84-426E-40DD-AFC4-6F175D3DCCD1}">
+                <a14:hiddenFill xmlns:a14="http://schemas.microsoft.com/office/drawing/2010/main">
+                  <a:solidFill>
+                    <a:srgbClr val="FFFFFF"/>
+                  </a:solidFill>
+                </a14:hiddenFill>
+              </a:ext>
+            </a:extLst>
+          </p:spPr>
+        </p:sp>
+        <p:sp>
+          <p:nvSpPr>
+            <p:cNvPr id="27" name="Freeform 21">
+              <a:extLst>
+                <a:ext uri="{FF2B5EF4-FFF2-40B4-BE49-F238E27FC236}">
+                  <a16:creationId xmlns:a16="http://schemas.microsoft.com/office/drawing/2014/main" id="{924210CA-0A35-4127-925F-D4084B7DC394}"/>
+                </a:ext>
+                <a:ext uri="{C183D7F6-B498-43B3-948B-1728B52AA6E4}">
+                  <adec:decorative xmlns:adec="http://schemas.microsoft.com/office/drawing/2017/decorative" val="1"/>
+                </a:ext>
+              </a:extLst>
+            </p:cNvPr>
+            <p:cNvSpPr/>
+            <p:nvPr>
+              <p:extLst>
+                <p:ext uri="{386F3935-93C4-4BCD-93E2-E3B085C9AB24}">
+                  <p16:designElem xmlns:p16="http://schemas.microsoft.com/office/powerpoint/2015/main" val="1"/>
+                </p:ext>
+              </p:extLst>
+            </p:nvPr>
+          </p:nvSpPr>
+          <p:spPr bwMode="auto">
+            <a:xfrm>
+              <a:off x="261938" y="0"/>
+              <a:ext cx="2944813" cy="6843713"/>
+            </a:xfrm>
+            <a:custGeom>
+              <a:avLst/>
+              <a:gdLst/>
+              <a:ahLst/>
+              <a:cxnLst/>
+              <a:rect l="0" t="0" r="r" b="b"/>
+              <a:pathLst>
+                <a:path w="620" h="1440">
+                  <a:moveTo>
+                    <a:pt x="620" y="0"/>
+                  </a:moveTo>
+                  <a:cubicBezTo>
+                    <a:pt x="248" y="325"/>
+                    <a:pt x="0" y="960"/>
+                    <a:pt x="186" y="1440"/>
+                  </a:cubicBezTo>
+                </a:path>
+              </a:pathLst>
+            </a:custGeom>
+            <a:noFill/>
+            <a:ln w="9525" cap="flat">
+              <a:solidFill>
+                <a:schemeClr val="bg1">
+                  <a:alpha val="35000"/>
+                </a:schemeClr>
+              </a:solidFill>
+              <a:prstDash val="lgDash"/>
+              <a:miter lim="800000"/>
+              <a:headEnd/>
+              <a:tailEnd/>
+            </a:ln>
+            <a:extLst>
+              <a:ext uri="{909E8E84-426E-40DD-AFC4-6F175D3DCCD1}">
+                <a14:hiddenFill xmlns:a14="http://schemas.microsoft.com/office/drawing/2010/main">
+                  <a:solidFill>
+                    <a:srgbClr val="FFFFFF"/>
+                  </a:solidFill>
+                </a14:hiddenFill>
+              </a:ext>
+            </a:extLst>
+          </p:spPr>
+        </p:sp>
+        <p:sp>
+          <p:nvSpPr>
+            <p:cNvPr id="28" name="Freeform 22">
+              <a:extLst>
+                <a:ext uri="{FF2B5EF4-FFF2-40B4-BE49-F238E27FC236}">
+                  <a16:creationId xmlns:a16="http://schemas.microsoft.com/office/drawing/2014/main" id="{DC13CEF1-DD2D-474C-B81C-820CEF3D9C3A}"/>
+                </a:ext>
+                <a:ext uri="{C183D7F6-B498-43B3-948B-1728B52AA6E4}">
+                  <adec:decorative xmlns:adec="http://schemas.microsoft.com/office/drawing/2017/decorative" val="1"/>
+                </a:ext>
+              </a:extLst>
+            </p:cNvPr>
+            <p:cNvSpPr/>
+            <p:nvPr>
+              <p:extLst>
+                <p:ext uri="{386F3935-93C4-4BCD-93E2-E3B085C9AB24}">
+                  <p16:designElem xmlns:p16="http://schemas.microsoft.com/office/powerpoint/2015/main" val="1"/>
+                </p:ext>
+              </p:extLst>
+            </p:nvPr>
+          </p:nvSpPr>
+          <p:spPr bwMode="auto">
+            <a:xfrm>
+              <a:off x="-417513" y="0"/>
+              <a:ext cx="2403475" cy="6843713"/>
+            </a:xfrm>
+            <a:custGeom>
+              <a:avLst/>
+              <a:gdLst/>
+              <a:ahLst/>
+              <a:cxnLst/>
+              <a:rect l="0" t="0" r="r" b="b"/>
+              <a:pathLst>
+                <a:path w="506" h="1440">
+                  <a:moveTo>
+                    <a:pt x="506" y="0"/>
+                  </a:moveTo>
+                  <a:cubicBezTo>
+                    <a:pt x="109" y="356"/>
+                    <a:pt x="0" y="943"/>
+                    <a:pt x="171" y="1440"/>
+                  </a:cubicBezTo>
+                </a:path>
+              </a:pathLst>
+            </a:custGeom>
+            <a:noFill/>
+            <a:ln w="9525" cap="flat">
+              <a:solidFill>
+                <a:schemeClr val="bg1">
+                  <a:alpha val="35000"/>
+                </a:schemeClr>
+              </a:solidFill>
+              <a:prstDash val="solid"/>
+              <a:miter lim="800000"/>
+              <a:headEnd/>
+              <a:tailEnd/>
+            </a:ln>
+            <a:extLst>
+              <a:ext uri="{909E8E84-426E-40DD-AFC4-6F175D3DCCD1}">
+                <a14:hiddenFill xmlns:a14="http://schemas.microsoft.com/office/drawing/2010/main">
+                  <a:solidFill>
+                    <a:srgbClr val="FFFFFF"/>
+                  </a:solidFill>
+                </a14:hiddenFill>
+              </a:ext>
+            </a:extLst>
+          </p:spPr>
+        </p:sp>
+        <p:sp>
+          <p:nvSpPr>
+            <p:cNvPr id="29" name="Freeform 23">
+              <a:extLst>
+                <a:ext uri="{FF2B5EF4-FFF2-40B4-BE49-F238E27FC236}">
+                  <a16:creationId xmlns:a16="http://schemas.microsoft.com/office/drawing/2014/main" id="{F889481A-8038-43E6-8EF1-A5F802CEDF15}"/>
+                </a:ext>
+                <a:ext uri="{C183D7F6-B498-43B3-948B-1728B52AA6E4}">
+                  <adec:decorative xmlns:adec="http://schemas.microsoft.com/office/drawing/2017/decorative" val="1"/>
+                </a:ext>
+              </a:extLst>
+            </p:cNvPr>
+            <p:cNvSpPr/>
+            <p:nvPr>
+              <p:extLst>
+                <p:ext uri="{386F3935-93C4-4BCD-93E2-E3B085C9AB24}">
+                  <p16:designElem xmlns:p16="http://schemas.microsoft.com/office/powerpoint/2015/main" val="1"/>
+                </p:ext>
+              </p:extLst>
+            </p:nvPr>
+          </p:nvSpPr>
+          <p:spPr bwMode="auto">
+            <a:xfrm>
+              <a:off x="14288" y="9525"/>
+              <a:ext cx="1771650" cy="3198813"/>
+            </a:xfrm>
+            <a:custGeom>
+              <a:avLst/>
+              <a:gdLst/>
+              <a:ahLst/>
+              <a:cxnLst/>
+              <a:rect l="0" t="0" r="r" b="b"/>
+              <a:pathLst>
+                <a:path w="373" h="673">
+                  <a:moveTo>
+                    <a:pt x="373" y="0"/>
+                  </a:moveTo>
+                  <a:cubicBezTo>
+                    <a:pt x="175" y="183"/>
+                    <a:pt x="51" y="409"/>
+                    <a:pt x="0" y="673"/>
+                  </a:cubicBezTo>
+                </a:path>
+              </a:pathLst>
+            </a:custGeom>
+            <a:noFill/>
+            <a:ln w="9525" cap="flat">
+              <a:solidFill>
+                <a:schemeClr val="bg1">
+                  <a:alpha val="35000"/>
+                </a:schemeClr>
+              </a:solidFill>
+              <a:prstDash val="solid"/>
+              <a:miter lim="800000"/>
+              <a:headEnd/>
+              <a:tailEnd/>
+            </a:ln>
+            <a:extLst>
+              <a:ext uri="{909E8E84-426E-40DD-AFC4-6F175D3DCCD1}">
+                <a14:hiddenFill xmlns:a14="http://schemas.microsoft.com/office/drawing/2010/main">
+                  <a:solidFill>
+                    <a:srgbClr val="FFFFFF"/>
+                  </a:solidFill>
+                </a14:hiddenFill>
+              </a:ext>
+            </a:extLst>
+          </p:spPr>
+        </p:sp>
+        <p:sp>
+          <p:nvSpPr>
+            <p:cNvPr id="30" name="Freeform 24">
+              <a:extLst>
+                <a:ext uri="{FF2B5EF4-FFF2-40B4-BE49-F238E27FC236}">
+                  <a16:creationId xmlns:a16="http://schemas.microsoft.com/office/drawing/2014/main" id="{128BD14A-9093-4854-A73A-F666B2ED2D21}"/>
+                </a:ext>
+                <a:ext uri="{C183D7F6-B498-43B3-948B-1728B52AA6E4}">
+                  <adec:decorative xmlns:adec="http://schemas.microsoft.com/office/drawing/2017/decorative" val="1"/>
+                </a:ext>
+              </a:extLst>
+            </p:cNvPr>
+            <p:cNvSpPr/>
+            <p:nvPr>
+              <p:extLst>
+                <p:ext uri="{386F3935-93C4-4BCD-93E2-E3B085C9AB24}">
+                  <p16:designElem xmlns:p16="http://schemas.microsoft.com/office/powerpoint/2015/main" val="1"/>
+                </p:ext>
+              </p:extLst>
+            </p:nvPr>
+          </p:nvSpPr>
+          <p:spPr bwMode="auto">
+            <a:xfrm>
+              <a:off x="4763" y="6016625"/>
+              <a:ext cx="214313" cy="827088"/>
+            </a:xfrm>
+            <a:custGeom>
+              <a:avLst/>
+              <a:gdLst/>
+              <a:ahLst/>
+              <a:cxnLst/>
+              <a:rect l="0" t="0" r="r" b="b"/>
+              <a:pathLst>
+                <a:path w="45" h="174">
+                  <a:moveTo>
+                    <a:pt x="0" y="0"/>
+                  </a:moveTo>
+                  <a:cubicBezTo>
+                    <a:pt x="11" y="59"/>
+                    <a:pt x="26" y="118"/>
+                    <a:pt x="45" y="174"/>
+                  </a:cubicBezTo>
+                </a:path>
+              </a:pathLst>
+            </a:custGeom>
+            <a:noFill/>
+            <a:ln w="9525" cap="flat">
+              <a:solidFill>
+                <a:schemeClr val="bg1">
+                  <a:alpha val="35000"/>
+                </a:schemeClr>
+              </a:solidFill>
+              <a:prstDash val="solid"/>
+              <a:miter lim="800000"/>
+              <a:headEnd/>
+              <a:tailEnd/>
+            </a:ln>
+            <a:extLst>
+              <a:ext uri="{909E8E84-426E-40DD-AFC4-6F175D3DCCD1}">
+                <a14:hiddenFill xmlns:a14="http://schemas.microsoft.com/office/drawing/2010/main">
+                  <a:solidFill>
+                    <a:srgbClr val="FFFFFF"/>
+                  </a:solidFill>
+                </a14:hiddenFill>
+              </a:ext>
+            </a:extLst>
+          </p:spPr>
+        </p:sp>
+        <p:sp>
+          <p:nvSpPr>
+            <p:cNvPr id="31" name="Freeform 25">
+              <a:extLst>
+                <a:ext uri="{FF2B5EF4-FFF2-40B4-BE49-F238E27FC236}">
+                  <a16:creationId xmlns:a16="http://schemas.microsoft.com/office/drawing/2014/main" id="{22D884F4-76EC-4371-B903-E79CF191E30F}"/>
+                </a:ext>
+                <a:ext uri="{C183D7F6-B498-43B3-948B-1728B52AA6E4}">
+                  <adec:decorative xmlns:adec="http://schemas.microsoft.com/office/drawing/2017/decorative" val="1"/>
+                </a:ext>
+              </a:extLst>
+            </p:cNvPr>
+            <p:cNvSpPr/>
+            <p:nvPr>
+              <p:extLst>
+                <p:ext uri="{386F3935-93C4-4BCD-93E2-E3B085C9AB24}">
+                  <p16:designElem xmlns:p16="http://schemas.microsoft.com/office/powerpoint/2015/main" val="1"/>
+                </p:ext>
+              </p:extLst>
+            </p:nvPr>
+          </p:nvSpPr>
+          <p:spPr bwMode="auto">
+            <a:xfrm>
+              <a:off x="14288" y="0"/>
+              <a:ext cx="1562100" cy="2228850"/>
+            </a:xfrm>
+            <a:custGeom>
+              <a:avLst/>
+              <a:gdLst/>
+              <a:ahLst/>
+              <a:cxnLst/>
+              <a:rect l="0" t="0" r="r" b="b"/>
+              <a:pathLst>
+                <a:path w="329" h="469">
+                  <a:moveTo>
+                    <a:pt x="329" y="0"/>
+                  </a:moveTo>
+                  <a:cubicBezTo>
+                    <a:pt x="189" y="133"/>
+                    <a:pt x="69" y="288"/>
+                    <a:pt x="0" y="469"/>
+                  </a:cubicBezTo>
+                </a:path>
+              </a:pathLst>
+            </a:custGeom>
+            <a:noFill/>
+            <a:ln w="9525" cap="flat">
+              <a:solidFill>
+                <a:schemeClr val="bg1">
+                  <a:alpha val="35000"/>
+                </a:schemeClr>
+              </a:solidFill>
+              <a:prstDash val="solid"/>
+              <a:miter lim="800000"/>
+              <a:headEnd/>
+              <a:tailEnd/>
+            </a:ln>
+            <a:extLst>
+              <a:ext uri="{909E8E84-426E-40DD-AFC4-6F175D3DCCD1}">
+                <a14:hiddenFill xmlns:a14="http://schemas.microsoft.com/office/drawing/2010/main">
+                  <a:solidFill>
+                    <a:srgbClr val="FFFFFF"/>
+                  </a:solidFill>
+                </a14:hiddenFill>
+              </a:ext>
+            </a:extLst>
+          </p:spPr>
+        </p:sp>
+      </p:grpSp>
+      <p:sp useBgFill="1">
+        <p:nvSpPr>
+          <p:cNvPr id="33" name="Rectangle 32">
+            <a:extLst>
+              <a:ext uri="{FF2B5EF4-FFF2-40B4-BE49-F238E27FC236}">
+                <a16:creationId xmlns:a16="http://schemas.microsoft.com/office/drawing/2014/main" id="{7C462C46-EFB7-4580-9921-DFC346FCC3C2}"/>
+              </a:ext>
+              <a:ext uri="{C183D7F6-B498-43B3-948B-1728B52AA6E4}">
+                <adec:decorative xmlns:adec="http://schemas.microsoft.com/office/drawing/2017/decorative" val="1"/>
+              </a:ext>
+            </a:extLst>
+          </p:cNvPr>
+          <p:cNvSpPr>
+            <a:spLocks noGrp="1" noRot="1" noChangeAspect="1" noMove="1" noResize="1" noEditPoints="1" noAdjustHandles="1" noChangeArrowheads="1" noChangeShapeType="1" noTextEdit="1"/>
+          </p:cNvSpPr>
+          <p:nvPr>
+            <p:extLst>
+              <p:ext uri="{386F3935-93C4-4BCD-93E2-E3B085C9AB24}">
+                <p16:designElem xmlns:p16="http://schemas.microsoft.com/office/powerpoint/2015/main" val="1"/>
+              </p:ext>
+            </p:extLst>
+          </p:nvPr>
+        </p:nvSpPr>
+        <p:spPr>
+          <a:xfrm>
+            <a:off x="1923665" y="0"/>
+            <a:ext cx="10268336" cy="6869208"/>
+          </a:xfrm>
+          <a:prstGeom prst="rect">
+            <a:avLst/>
+          </a:prstGeom>
+          <a:ln>
+            <a:noFill/>
+          </a:ln>
+        </p:spPr>
+        <p:style>
+          <a:lnRef idx="2">
+            <a:schemeClr val="accent1">
+              <a:shade val="50000"/>
+            </a:schemeClr>
+          </a:lnRef>
+          <a:fillRef idx="1">
+            <a:schemeClr val="accent1"/>
+          </a:fillRef>
+          <a:effectRef idx="0">
+            <a:schemeClr val="accent1"/>
+          </a:effectRef>
+          <a:fontRef idx="minor">
+            <a:schemeClr val="lt1"/>
+          </a:fontRef>
+        </p:style>
+        <p:txBody>
+          <a:bodyPr rtlCol="0" anchor="ctr"/>
+          <a:lstStyle/>
+          <a:p>
+            <a:pPr algn="ctr"/>
+            <a:endParaRPr lang="en-US"/>
+          </a:p>
+        </p:txBody>
+      </p:sp>
+      <p:sp>
+        <p:nvSpPr>
+          <p:cNvPr id="2" name="Title 1">
+            <a:extLst>
+              <a:ext uri="{FF2B5EF4-FFF2-40B4-BE49-F238E27FC236}">
+                <a16:creationId xmlns:a16="http://schemas.microsoft.com/office/drawing/2014/main" id="{69C6A537-35CD-A49B-32A8-1110CF146A8C}"/>
+              </a:ext>
+            </a:extLst>
+          </p:cNvPr>
+          <p:cNvSpPr>
+            <a:spLocks noGrp="1"/>
+          </p:cNvSpPr>
+          <p:nvPr>
+            <p:ph type="title"/>
+          </p:nvPr>
+        </p:nvSpPr>
+        <p:spPr>
+          <a:xfrm>
+            <a:off x="2880485" y="841375"/>
+            <a:ext cx="6230857" cy="1230570"/>
+          </a:xfrm>
+        </p:spPr>
+        <p:txBody>
+          <a:bodyPr anchor="t">
+            <a:normAutofit/>
+          </a:bodyPr>
+          <a:lstStyle/>
+          <a:p>
+            <a:pPr algn="l"/>
+            <a:endParaRPr lang="en-US" sz="3600">
+              <a:solidFill>
+                <a:schemeClr val="accent1"/>
+              </a:solidFill>
+            </a:endParaRPr>
+          </a:p>
+        </p:txBody>
+      </p:sp>
+      <p:sp>
+        <p:nvSpPr>
+          <p:cNvPr id="35" name="Isosceles Triangle 34">
+            <a:extLst>
+              <a:ext uri="{FF2B5EF4-FFF2-40B4-BE49-F238E27FC236}">
+                <a16:creationId xmlns:a16="http://schemas.microsoft.com/office/drawing/2014/main" id="{B8B918B4-AB10-4E3A-916E-A9625586EA47}"/>
+              </a:ext>
+              <a:ext uri="{C183D7F6-B498-43B3-948B-1728B52AA6E4}">
+                <adec:decorative xmlns:adec="http://schemas.microsoft.com/office/drawing/2017/decorative" val="1"/>
+              </a:ext>
+            </a:extLst>
+          </p:cNvPr>
+          <p:cNvSpPr>
+            <a:spLocks noGrp="1" noRot="1" noChangeAspect="1" noMove="1" noResize="1" noEditPoints="1" noAdjustHandles="1" noChangeArrowheads="1" noChangeShapeType="1" noTextEdit="1"/>
+          </p:cNvSpPr>
+          <p:nvPr>
+            <p:extLst>
+              <p:ext uri="{386F3935-93C4-4BCD-93E2-E3B085C9AB24}">
+                <p16:designElem xmlns:p16="http://schemas.microsoft.com/office/powerpoint/2015/main" val="1"/>
+              </p:ext>
+            </p:extLst>
+          </p:nvPr>
+        </p:nvSpPr>
+        <p:spPr>
+          <a:xfrm rot="5400000">
+            <a:off x="1797903" y="954813"/>
+            <a:ext cx="300774" cy="259288"/>
+          </a:xfrm>
+          <a:prstGeom prst="triangle">
+            <a:avLst/>
+          </a:prstGeom>
+          <a:solidFill>
+            <a:schemeClr val="accent1"/>
+          </a:solidFill>
+          <a:ln>
+            <a:noFill/>
+          </a:ln>
+        </p:spPr>
+        <p:style>
+          <a:lnRef idx="2">
+            <a:schemeClr val="accent1">
+              <a:shade val="50000"/>
+            </a:schemeClr>
+          </a:lnRef>
+          <a:fillRef idx="1">
+            <a:schemeClr val="accent1"/>
+          </a:fillRef>
+          <a:effectRef idx="0">
+            <a:schemeClr val="accent1"/>
+          </a:effectRef>
+          <a:fontRef idx="minor">
+            <a:schemeClr val="lt1"/>
+          </a:fontRef>
+        </p:style>
+        <p:txBody>
           <a:bodyPr/>
           <a:lstStyle/>
           <a:p>
@@ -15864,10 +17643,72 @@
           </a:p>
         </p:txBody>
       </p:sp>
+      <p:sp>
+        <p:nvSpPr>
+          <p:cNvPr id="3" name="Content Placeholder 2">
+            <a:extLst>
+              <a:ext uri="{FF2B5EF4-FFF2-40B4-BE49-F238E27FC236}">
+                <a16:creationId xmlns:a16="http://schemas.microsoft.com/office/drawing/2014/main" id="{B804F9BE-9C62-599F-DED7-121C629F1403}"/>
+              </a:ext>
+            </a:extLst>
+          </p:cNvPr>
+          <p:cNvSpPr>
+            <a:spLocks noGrp="1"/>
+          </p:cNvSpPr>
+          <p:nvPr>
+            <p:ph idx="1"/>
+          </p:nvPr>
+        </p:nvSpPr>
+        <p:spPr>
+          <a:xfrm>
+            <a:off x="2880487" y="2249046"/>
+            <a:ext cx="6123783" cy="3802762"/>
+          </a:xfrm>
+        </p:spPr>
+        <p:txBody>
+          <a:bodyPr anchor="t">
+            <a:normAutofit/>
+          </a:bodyPr>
+          <a:lstStyle/>
+          <a:p>
+            <a:endParaRPr lang="en-US" sz="1600"/>
+          </a:p>
+        </p:txBody>
+      </p:sp>
     </p:spTree>
     <p:extLst>
       <p:ext uri="{BB962C8B-B14F-4D97-AF65-F5344CB8AC3E}">
-        <p14:creationId xmlns:p14="http://schemas.microsoft.com/office/powerpoint/2010/main" val="2693138491"/>
+        <p14:creationId xmlns:p14="http://schemas.microsoft.com/office/powerpoint/2010/main" val="293945397"/>
+      </p:ext>
+    </p:extLst>
+  </p:cSld>
+  <p:clrMapOvr>
+    <a:masterClrMapping/>
+  </p:clrMapOvr>
+</p:sld>
+</file>
+
+<file path=ppt/slides/slide3.xml><?xml version="1.0" encoding="utf-8"?>
+<p:sld xmlns:a="http://schemas.openxmlformats.org/drawingml/2006/main" xmlns:r="http://schemas.openxmlformats.org/officeDocument/2006/relationships" xmlns:p="http://schemas.openxmlformats.org/presentationml/2006/main">
+  <p:cSld>
+    <p:spTree>
+      <p:nvGrpSpPr>
+        <p:cNvPr id="1" name=""/>
+        <p:cNvGrpSpPr/>
+        <p:nvPr/>
+      </p:nvGrpSpPr>
+      <p:grpSpPr>
+        <a:xfrm>
+          <a:off x="0" y="0"/>
+          <a:ext cx="0" cy="0"/>
+          <a:chOff x="0" y="0"/>
+          <a:chExt cx="0" cy="0"/>
+        </a:xfrm>
+      </p:grpSpPr>
+    </p:spTree>
+    <p:extLst>
+      <p:ext uri="{BB962C8B-B14F-4D97-AF65-F5344CB8AC3E}">
+        <p14:creationId xmlns:p14="http://schemas.microsoft.com/office/powerpoint/2010/main" val="3448754668"/>
       </p:ext>
     </p:extLst>
   </p:cSld>

</xml_diff>